<commit_message>
text corpus for deforestation_text is not updated in the output
</commit_message>
<xml_diff>
--- a/input_files/File Format for Control Union.pptx
+++ b/input_files/File Format for Control Union.pptx
@@ -6238,8 +6238,8 @@
         </p:nvSpPr>
         <p:spPr>
           <a:xfrm>
-            <a:off x="588000" y="2535275"/>
-            <a:ext cx="1828800" cy="704778"/>
+            <a:off x="513188" y="2869306"/>
+            <a:ext cx="1828800" cy="444707"/>
           </a:xfrm>
           <a:prstGeom prst="rect">
             <a:avLst/>
@@ -6254,28 +6254,6 @@
             <a:spAutoFit/>
           </a:bodyPr>
           <a:lstStyle/>
-          <a:p>
-            <a:pPr marL="0" lvl="0" indent="0" algn="l" rtl="0">
-              <a:lnSpc>
-                <a:spcPct val="115000"/>
-              </a:lnSpc>
-              <a:spcBef>
-                <a:spcPts val="1200"/>
-              </a:spcBef>
-              <a:spcAft>
-                <a:spcPts val="0"/>
-              </a:spcAft>
-              <a:buNone/>
-            </a:pPr>
-            <a:r>
-              <a:rPr lang="en-GB" sz="600" dirty="0"/>
-              <a:t>d</a:t>
-            </a:r>
-            <a:r>
-              <a:rPr lang="en" sz="600" dirty="0"/>
-              <a:t>eforestation_text</a:t>
-            </a:r>
-          </a:p>
           <a:p>
             <a:pPr marL="0" lvl="0" indent="0" algn="l" rtl="0">
               <a:lnSpc>
@@ -7367,7 +7345,7 @@
           <p:nvPr>
             <p:extLst>
               <p:ext uri="{D42A27DB-BD31-4B8C-83A1-F6EECF244321}">
-                <p14:modId xmlns:p14="http://schemas.microsoft.com/office/powerpoint/2010/main" val="821482407"/>
+                <p14:modId xmlns:p14="http://schemas.microsoft.com/office/powerpoint/2010/main" val="490622758"/>
               </p:ext>
             </p:extLst>
           </p:nvPr>
@@ -7430,14 +7408,6 @@
                         </a:spcAft>
                         <a:buNone/>
                       </a:pPr>
-                      <a:r>
-                        <a:rPr lang="en-GB" sz="500" dirty="0"/>
-                        <a:t>t</a:t>
-                      </a:r>
-                      <a:r>
-                        <a:rPr lang="en" sz="500" dirty="0"/>
-                        <a:t>otal_area_val</a:t>
-                      </a:r>
                       <a:endParaRPr sz="500" dirty="0"/>
                     </a:p>
                   </a:txBody>
@@ -7461,7 +7431,6 @@
                         <a:rPr lang="en" sz="500" dirty="0"/>
                         <a:t>Inters. - Potec. Areas</a:t>
                       </a:r>
-                      <a:endParaRPr sz="500" dirty="0"/>
                     </a:p>
                     <a:p>
                       <a:pPr marL="0" lvl="0" indent="0" algn="l" rtl="0">
@@ -7473,10 +7442,6 @@
                         </a:spcAft>
                         <a:buNone/>
                       </a:pPr>
-                      <a:r>
-                        <a:rPr lang="en" sz="500" dirty="0"/>
-                        <a:t>potec_val</a:t>
-                      </a:r>
                       <a:endParaRPr sz="500" dirty="0"/>
                     </a:p>
                   </a:txBody>
@@ -7519,14 +7484,6 @@
                         </a:spcAft>
                         <a:buNone/>
                       </a:pPr>
-                      <a:r>
-                        <a:rPr lang="en-GB" sz="500" dirty="0"/>
-                        <a:t>d</a:t>
-                      </a:r>
-                      <a:r>
-                        <a:rPr lang="en" sz="500" dirty="0"/>
-                        <a:t>ef_val</a:t>
-                      </a:r>
                       <a:endParaRPr sz="500" dirty="0"/>
                     </a:p>
                   </a:txBody>
@@ -7550,7 +7507,6 @@
                         <a:rPr lang="en" sz="500" dirty="0"/>
                         <a:t>Eligible Area</a:t>
                       </a:r>
-                      <a:endParaRPr sz="500" dirty="0"/>
                     </a:p>
                     <a:p>
                       <a:pPr marL="0" lvl="0" indent="0" algn="l" rtl="0">
@@ -7562,14 +7518,6 @@
                         </a:spcAft>
                         <a:buNone/>
                       </a:pPr>
-                      <a:r>
-                        <a:rPr lang="en-GB" sz="500" dirty="0"/>
-                        <a:t>e</a:t>
-                      </a:r>
-                      <a:r>
-                        <a:rPr lang="en" sz="500" dirty="0"/>
-                        <a:t>ligible_area_val</a:t>
-                      </a:r>
                       <a:endParaRPr sz="500" dirty="0"/>
                     </a:p>
                   </a:txBody>
@@ -7700,6 +7648,210 @@
               <a:buNone/>
             </a:pPr>
             <a:endParaRPr/>
+          </a:p>
+        </p:txBody>
+      </p:sp>
+      <p:sp>
+        <p:nvSpPr>
+          <p:cNvPr id="2" name="TextBox 1">
+            <a:extLst>
+              <a:ext uri="{FF2B5EF4-FFF2-40B4-BE49-F238E27FC236}">
+                <a16:creationId xmlns:a16="http://schemas.microsoft.com/office/drawing/2014/main" id="{DEB22662-DD3C-4412-A95E-0C0BBE8148AA}"/>
+              </a:ext>
+            </a:extLst>
+          </p:cNvPr>
+          <p:cNvSpPr txBox="1"/>
+          <p:nvPr/>
+        </p:nvSpPr>
+        <p:spPr>
+          <a:xfrm>
+            <a:off x="333261" y="3954066"/>
+            <a:ext cx="583814" cy="169277"/>
+          </a:xfrm>
+          <a:prstGeom prst="rect">
+            <a:avLst/>
+          </a:prstGeom>
+          <a:noFill/>
+        </p:spPr>
+        <p:txBody>
+          <a:bodyPr wrap="none" rtlCol="0">
+            <a:spAutoFit/>
+          </a:bodyPr>
+          <a:lstStyle/>
+          <a:p>
+            <a:r>
+              <a:rPr lang="en-US" sz="500" dirty="0" err="1"/>
+              <a:t>total_area_val</a:t>
+            </a:r>
+            <a:endParaRPr lang="en-GB" sz="500" dirty="0"/>
+          </a:p>
+        </p:txBody>
+      </p:sp>
+      <p:sp>
+        <p:nvSpPr>
+          <p:cNvPr id="3" name="TextBox 2">
+            <a:extLst>
+              <a:ext uri="{FF2B5EF4-FFF2-40B4-BE49-F238E27FC236}">
+                <a16:creationId xmlns:a16="http://schemas.microsoft.com/office/drawing/2014/main" id="{DB4AC510-F0C7-89B5-31A6-E05DF80DD058}"/>
+              </a:ext>
+            </a:extLst>
+          </p:cNvPr>
+          <p:cNvSpPr txBox="1"/>
+          <p:nvPr/>
+        </p:nvSpPr>
+        <p:spPr>
+          <a:xfrm>
+            <a:off x="1149999" y="3946497"/>
+            <a:ext cx="457176" cy="169277"/>
+          </a:xfrm>
+          <a:prstGeom prst="rect">
+            <a:avLst/>
+          </a:prstGeom>
+          <a:noFill/>
+        </p:spPr>
+        <p:txBody>
+          <a:bodyPr wrap="none" rtlCol="0">
+            <a:spAutoFit/>
+          </a:bodyPr>
+          <a:lstStyle/>
+          <a:p>
+            <a:r>
+              <a:rPr lang="en-US" sz="500" dirty="0" err="1"/>
+              <a:t>potec_val</a:t>
+            </a:r>
+            <a:endParaRPr lang="en-GB" sz="500" dirty="0"/>
+          </a:p>
+        </p:txBody>
+      </p:sp>
+      <p:sp>
+        <p:nvSpPr>
+          <p:cNvPr id="4" name="TextBox 3">
+            <a:extLst>
+              <a:ext uri="{FF2B5EF4-FFF2-40B4-BE49-F238E27FC236}">
+                <a16:creationId xmlns:a16="http://schemas.microsoft.com/office/drawing/2014/main" id="{6560F30C-0D9A-99D5-7177-94DA90A0F9A1}"/>
+              </a:ext>
+            </a:extLst>
+          </p:cNvPr>
+          <p:cNvSpPr txBox="1"/>
+          <p:nvPr/>
+        </p:nvSpPr>
+        <p:spPr>
+          <a:xfrm>
+            <a:off x="336028" y="4384836"/>
+            <a:ext cx="389850" cy="169277"/>
+          </a:xfrm>
+          <a:prstGeom prst="rect">
+            <a:avLst/>
+          </a:prstGeom>
+          <a:noFill/>
+        </p:spPr>
+        <p:txBody>
+          <a:bodyPr wrap="none" rtlCol="0">
+            <a:spAutoFit/>
+          </a:bodyPr>
+          <a:lstStyle/>
+          <a:p>
+            <a:r>
+              <a:rPr lang="en-US" sz="500" dirty="0" err="1"/>
+              <a:t>def_val</a:t>
+            </a:r>
+            <a:endParaRPr lang="en-GB" sz="500" dirty="0"/>
+          </a:p>
+        </p:txBody>
+      </p:sp>
+      <p:sp>
+        <p:nvSpPr>
+          <p:cNvPr id="5" name="TextBox 4">
+            <a:extLst>
+              <a:ext uri="{FF2B5EF4-FFF2-40B4-BE49-F238E27FC236}">
+                <a16:creationId xmlns:a16="http://schemas.microsoft.com/office/drawing/2014/main" id="{88DE5B6A-C30A-EADB-83DE-35F3FB3F464C}"/>
+              </a:ext>
+            </a:extLst>
+          </p:cNvPr>
+          <p:cNvSpPr txBox="1"/>
+          <p:nvPr/>
+        </p:nvSpPr>
+        <p:spPr>
+          <a:xfrm>
+            <a:off x="1039356" y="4387086"/>
+            <a:ext cx="662361" cy="169277"/>
+          </a:xfrm>
+          <a:prstGeom prst="rect">
+            <a:avLst/>
+          </a:prstGeom>
+          <a:noFill/>
+        </p:spPr>
+        <p:txBody>
+          <a:bodyPr wrap="none" rtlCol="0">
+            <a:spAutoFit/>
+          </a:bodyPr>
+          <a:lstStyle/>
+          <a:p>
+            <a:pPr marL="0" lvl="0" indent="0" algn="l" rtl="0">
+              <a:spcBef>
+                <a:spcPts val="0"/>
+              </a:spcBef>
+              <a:spcAft>
+                <a:spcPts val="0"/>
+              </a:spcAft>
+              <a:buNone/>
+            </a:pPr>
+            <a:r>
+              <a:rPr lang="en-GB" sz="500" dirty="0" err="1"/>
+              <a:t>eligible_area_val</a:t>
+            </a:r>
+            <a:endParaRPr lang="en-GB" sz="500" dirty="0"/>
+          </a:p>
+        </p:txBody>
+      </p:sp>
+      <p:sp>
+        <p:nvSpPr>
+          <p:cNvPr id="6" name="TextBox 5">
+            <a:extLst>
+              <a:ext uri="{FF2B5EF4-FFF2-40B4-BE49-F238E27FC236}">
+                <a16:creationId xmlns:a16="http://schemas.microsoft.com/office/drawing/2014/main" id="{5082FEB8-8105-BEF6-5C36-2852D669894F}"/>
+              </a:ext>
+            </a:extLst>
+          </p:cNvPr>
+          <p:cNvSpPr txBox="1"/>
+          <p:nvPr/>
+        </p:nvSpPr>
+        <p:spPr>
+          <a:xfrm>
+            <a:off x="531293" y="2695566"/>
+            <a:ext cx="1961929" cy="189475"/>
+          </a:xfrm>
+          <a:prstGeom prst="rect">
+            <a:avLst/>
+          </a:prstGeom>
+          <a:noFill/>
+        </p:spPr>
+        <p:txBody>
+          <a:bodyPr wrap="square" rtlCol="0">
+            <a:spAutoFit/>
+          </a:bodyPr>
+          <a:lstStyle/>
+          <a:p>
+            <a:pPr marL="0" lvl="0" indent="0" algn="l" rtl="0">
+              <a:lnSpc>
+                <a:spcPct val="115000"/>
+              </a:lnSpc>
+              <a:spcBef>
+                <a:spcPts val="1200"/>
+              </a:spcBef>
+              <a:spcAft>
+                <a:spcPts val="0"/>
+              </a:spcAft>
+              <a:buNone/>
+            </a:pPr>
+            <a:r>
+              <a:rPr lang="en-GB" sz="600" dirty="0"/>
+              <a:t>d</a:t>
+            </a:r>
+            <a:r>
+              <a:rPr lang="en" sz="600" dirty="0"/>
+              <a:t>eforestation_text</a:t>
+            </a:r>
           </a:p>
         </p:txBody>
       </p:sp>

</xml_diff>

<commit_message>
text corpus for deforestation_text is still not updated in the output, Can add images that are saved in the device itself to the final output
</commit_message>
<xml_diff>
--- a/input_files/File Format for Control Union.pptx
+++ b/input_files/File Format for Control Union.pptx
@@ -7226,118 +7226,6 @@
           </a:p>
         </p:txBody>
       </p:sp>
-      <p:pic>
-        <p:nvPicPr>
-          <p:cNvPr id="91" name="Google Shape;91;p13"/>
-          <p:cNvPicPr preferRelativeResize="0"/>
-          <p:nvPr/>
-        </p:nvPicPr>
-        <p:blipFill>
-          <a:blip r:embed="rId4">
-            <a:alphaModFix/>
-          </a:blip>
-          <a:stretch>
-            <a:fillRect/>
-          </a:stretch>
-        </p:blipFill>
-        <p:spPr>
-          <a:xfrm>
-            <a:off x="445374" y="674025"/>
-            <a:ext cx="1917279" cy="1828800"/>
-          </a:xfrm>
-          <a:prstGeom prst="rect">
-            <a:avLst/>
-          </a:prstGeom>
-          <a:noFill/>
-          <a:ln>
-            <a:noFill/>
-          </a:ln>
-        </p:spPr>
-      </p:pic>
-      <p:pic>
-        <p:nvPicPr>
-          <p:cNvPr id="92" name="Google Shape;92;p13"/>
-          <p:cNvPicPr preferRelativeResize="0"/>
-          <p:nvPr/>
-        </p:nvPicPr>
-        <p:blipFill>
-          <a:blip r:embed="rId4">
-            <a:alphaModFix/>
-          </a:blip>
-          <a:stretch>
-            <a:fillRect/>
-          </a:stretch>
-        </p:blipFill>
-        <p:spPr>
-          <a:xfrm>
-            <a:off x="2590162" y="669200"/>
-            <a:ext cx="1917279" cy="1828800"/>
-          </a:xfrm>
-          <a:prstGeom prst="rect">
-            <a:avLst/>
-          </a:prstGeom>
-          <a:noFill/>
-          <a:ln>
-            <a:noFill/>
-          </a:ln>
-        </p:spPr>
-      </p:pic>
-      <p:pic>
-        <p:nvPicPr>
-          <p:cNvPr id="93" name="Google Shape;93;p13"/>
-          <p:cNvPicPr preferRelativeResize="0"/>
-          <p:nvPr/>
-        </p:nvPicPr>
-        <p:blipFill>
-          <a:blip r:embed="rId4">
-            <a:alphaModFix/>
-          </a:blip>
-          <a:stretch>
-            <a:fillRect/>
-          </a:stretch>
-        </p:blipFill>
-        <p:spPr>
-          <a:xfrm>
-            <a:off x="4658687" y="674025"/>
-            <a:ext cx="1917279" cy="1828800"/>
-          </a:xfrm>
-          <a:prstGeom prst="rect">
-            <a:avLst/>
-          </a:prstGeom>
-          <a:noFill/>
-          <a:ln>
-            <a:noFill/>
-          </a:ln>
-        </p:spPr>
-      </p:pic>
-      <p:pic>
-        <p:nvPicPr>
-          <p:cNvPr id="94" name="Google Shape;94;p13"/>
-          <p:cNvPicPr preferRelativeResize="0"/>
-          <p:nvPr/>
-        </p:nvPicPr>
-        <p:blipFill>
-          <a:blip r:embed="rId4">
-            <a:alphaModFix/>
-          </a:blip>
-          <a:stretch>
-            <a:fillRect/>
-          </a:stretch>
-        </p:blipFill>
-        <p:spPr>
-          <a:xfrm>
-            <a:off x="6727199" y="669200"/>
-            <a:ext cx="1917279" cy="1828800"/>
-          </a:xfrm>
-          <a:prstGeom prst="rect">
-            <a:avLst/>
-          </a:prstGeom>
-          <a:noFill/>
-          <a:ln>
-            <a:noFill/>
-          </a:ln>
-        </p:spPr>
-      </p:pic>
       <p:graphicFrame>
         <p:nvGraphicFramePr>
           <p:cNvPr id="95" name="Google Shape;95;p13"/>
@@ -7540,7 +7428,7 @@
           <p:nvPr/>
         </p:nvPicPr>
         <p:blipFill>
-          <a:blip r:embed="rId5">
+          <a:blip r:embed="rId4">
             <a:alphaModFix amt="30000"/>
           </a:blip>
           <a:stretch>
@@ -7852,6 +7740,206 @@
               <a:rPr lang="en" sz="600" dirty="0"/>
               <a:t>eforestation_text</a:t>
             </a:r>
+          </a:p>
+        </p:txBody>
+      </p:sp>
+      <p:sp>
+        <p:nvSpPr>
+          <p:cNvPr id="8" name="Rectangle 7">
+            <a:extLst>
+              <a:ext uri="{FF2B5EF4-FFF2-40B4-BE49-F238E27FC236}">
+                <a16:creationId xmlns:a16="http://schemas.microsoft.com/office/drawing/2014/main" id="{A09F6E15-68AB-DD51-68C9-3C63D1DBF073}"/>
+              </a:ext>
+            </a:extLst>
+          </p:cNvPr>
+          <p:cNvSpPr/>
+          <p:nvPr/>
+        </p:nvSpPr>
+        <p:spPr>
+          <a:xfrm>
+            <a:off x="462078" y="682644"/>
+            <a:ext cx="1926785" cy="1814848"/>
+          </a:xfrm>
+          <a:prstGeom prst="rect">
+            <a:avLst/>
+          </a:prstGeom>
+        </p:spPr>
+        <p:style>
+          <a:lnRef idx="2">
+            <a:schemeClr val="accent1">
+              <a:shade val="15000"/>
+            </a:schemeClr>
+          </a:lnRef>
+          <a:fillRef idx="1">
+            <a:schemeClr val="accent1"/>
+          </a:fillRef>
+          <a:effectRef idx="0">
+            <a:schemeClr val="accent1"/>
+          </a:effectRef>
+          <a:fontRef idx="minor">
+            <a:schemeClr val="lt1"/>
+          </a:fontRef>
+        </p:style>
+        <p:txBody>
+          <a:bodyPr rtlCol="0" anchor="ctr"/>
+          <a:lstStyle/>
+          <a:p>
+            <a:pPr algn="ctr"/>
+            <a:r>
+              <a:rPr lang="en-US" dirty="0"/>
+              <a:t>image_1</a:t>
+            </a:r>
+            <a:endParaRPr lang="en-GB" dirty="0"/>
+          </a:p>
+        </p:txBody>
+      </p:sp>
+      <p:sp>
+        <p:nvSpPr>
+          <p:cNvPr id="7" name="Rectangle 6">
+            <a:extLst>
+              <a:ext uri="{FF2B5EF4-FFF2-40B4-BE49-F238E27FC236}">
+                <a16:creationId xmlns:a16="http://schemas.microsoft.com/office/drawing/2014/main" id="{B4DC9AB4-D71D-3CC9-9270-225389FF6B76}"/>
+              </a:ext>
+            </a:extLst>
+          </p:cNvPr>
+          <p:cNvSpPr/>
+          <p:nvPr/>
+        </p:nvSpPr>
+        <p:spPr>
+          <a:xfrm>
+            <a:off x="2544092" y="699289"/>
+            <a:ext cx="1926785" cy="1814848"/>
+          </a:xfrm>
+          <a:prstGeom prst="rect">
+            <a:avLst/>
+          </a:prstGeom>
+        </p:spPr>
+        <p:style>
+          <a:lnRef idx="2">
+            <a:schemeClr val="accent1">
+              <a:shade val="15000"/>
+            </a:schemeClr>
+          </a:lnRef>
+          <a:fillRef idx="1">
+            <a:schemeClr val="accent1"/>
+          </a:fillRef>
+          <a:effectRef idx="0">
+            <a:schemeClr val="accent1"/>
+          </a:effectRef>
+          <a:fontRef idx="minor">
+            <a:schemeClr val="lt1"/>
+          </a:fontRef>
+        </p:style>
+        <p:txBody>
+          <a:bodyPr rtlCol="0" anchor="ctr"/>
+          <a:lstStyle/>
+          <a:p>
+            <a:pPr algn="ctr"/>
+            <a:r>
+              <a:rPr lang="en-US" dirty="0"/>
+              <a:t>image_2</a:t>
+            </a:r>
+            <a:endParaRPr lang="en-GB" dirty="0"/>
+          </a:p>
+        </p:txBody>
+      </p:sp>
+      <p:sp>
+        <p:nvSpPr>
+          <p:cNvPr id="9" name="Rectangle 8">
+            <a:extLst>
+              <a:ext uri="{FF2B5EF4-FFF2-40B4-BE49-F238E27FC236}">
+                <a16:creationId xmlns:a16="http://schemas.microsoft.com/office/drawing/2014/main" id="{D9981F7F-DD0B-DDA3-4A4F-951CF8896883}"/>
+              </a:ext>
+            </a:extLst>
+          </p:cNvPr>
+          <p:cNvSpPr/>
+          <p:nvPr/>
+        </p:nvSpPr>
+        <p:spPr>
+          <a:xfrm>
+            <a:off x="4647502" y="691017"/>
+            <a:ext cx="1926785" cy="1814848"/>
+          </a:xfrm>
+          <a:prstGeom prst="rect">
+            <a:avLst/>
+          </a:prstGeom>
+        </p:spPr>
+        <p:style>
+          <a:lnRef idx="2">
+            <a:schemeClr val="accent1">
+              <a:shade val="15000"/>
+            </a:schemeClr>
+          </a:lnRef>
+          <a:fillRef idx="1">
+            <a:schemeClr val="accent1"/>
+          </a:fillRef>
+          <a:effectRef idx="0">
+            <a:schemeClr val="accent1"/>
+          </a:effectRef>
+          <a:fontRef idx="minor">
+            <a:schemeClr val="lt1"/>
+          </a:fontRef>
+        </p:style>
+        <p:txBody>
+          <a:bodyPr rtlCol="0" anchor="ctr"/>
+          <a:lstStyle/>
+          <a:p>
+            <a:pPr algn="ctr"/>
+            <a:r>
+              <a:rPr lang="en-US" dirty="0"/>
+              <a:t>image_3</a:t>
+            </a:r>
+            <a:endParaRPr lang="en-GB" dirty="0"/>
+          </a:p>
+        </p:txBody>
+      </p:sp>
+      <p:sp>
+        <p:nvSpPr>
+          <p:cNvPr id="10" name="Rectangle 9">
+            <a:extLst>
+              <a:ext uri="{FF2B5EF4-FFF2-40B4-BE49-F238E27FC236}">
+                <a16:creationId xmlns:a16="http://schemas.microsoft.com/office/drawing/2014/main" id="{96C48D7E-D92A-ABDA-88CA-8E0B08A8C99B}"/>
+              </a:ext>
+            </a:extLst>
+          </p:cNvPr>
+          <p:cNvSpPr/>
+          <p:nvPr/>
+        </p:nvSpPr>
+        <p:spPr>
+          <a:xfrm>
+            <a:off x="6736623" y="699289"/>
+            <a:ext cx="1926785" cy="1814848"/>
+          </a:xfrm>
+          <a:prstGeom prst="rect">
+            <a:avLst/>
+          </a:prstGeom>
+        </p:spPr>
+        <p:style>
+          <a:lnRef idx="2">
+            <a:schemeClr val="accent1">
+              <a:shade val="15000"/>
+            </a:schemeClr>
+          </a:lnRef>
+          <a:fillRef idx="1">
+            <a:schemeClr val="accent1"/>
+          </a:fillRef>
+          <a:effectRef idx="0">
+            <a:schemeClr val="accent1"/>
+          </a:effectRef>
+          <a:fontRef idx="minor">
+            <a:schemeClr val="lt1"/>
+          </a:fontRef>
+        </p:style>
+        <p:txBody>
+          <a:bodyPr rtlCol="0" anchor="ctr"/>
+          <a:lstStyle/>
+          <a:p>
+            <a:pPr algn="ctr"/>
+            <a:r>
+              <a:rPr lang="en-US"/>
+              <a:t>image_4</a:t>
+            </a:r>
+            <a:endParaRPr lang="en-GB" dirty="0"/>
           </a:p>
         </p:txBody>
       </p:sp>

</xml_diff>

<commit_message>
fixed first deforestration placeholder data issue
</commit_message>
<xml_diff>
--- a/input_files/File Format for Control Union.pptx
+++ b/input_files/File Format for Control Union.pptx
@@ -5523,14 +5523,14 @@
               <a:buNone/>
             </a:pPr>
             <a:r>
-              <a:rPr lang="en" sz="900" b="1">
+              <a:rPr lang="en" sz="900" b="1" dirty="0">
                 <a:solidFill>
                   <a:schemeClr val="dk2"/>
                 </a:solidFill>
               </a:rPr>
-              <a:t>2020</a:t>
+              <a:t>year1</a:t>
             </a:r>
-            <a:endParaRPr sz="1800">
+            <a:endParaRPr sz="1800" dirty="0">
               <a:solidFill>
                 <a:schemeClr val="dk2"/>
               </a:solidFill>
@@ -6496,14 +6496,14 @@
               <a:buNone/>
             </a:pPr>
             <a:r>
-              <a:rPr lang="en" sz="900" b="1">
+              <a:rPr lang="en" sz="900" b="1" dirty="0">
                 <a:solidFill>
                   <a:schemeClr val="dk2"/>
                 </a:solidFill>
               </a:rPr>
-              <a:t>2021</a:t>
+              <a:t>year2</a:t>
             </a:r>
-            <a:endParaRPr sz="1800">
+            <a:endParaRPr sz="1800" dirty="0">
               <a:solidFill>
                 <a:schemeClr val="dk2"/>
               </a:solidFill>
@@ -6546,14 +6546,14 @@
               <a:buNone/>
             </a:pPr>
             <a:r>
-              <a:rPr lang="en" sz="900" b="1">
+              <a:rPr lang="en" sz="900" b="1" dirty="0">
                 <a:solidFill>
                   <a:schemeClr val="dk2"/>
                 </a:solidFill>
               </a:rPr>
-              <a:t>2022</a:t>
+              <a:t>year3</a:t>
             </a:r>
-            <a:endParaRPr sz="1800">
+            <a:endParaRPr sz="1800" dirty="0">
               <a:solidFill>
                 <a:schemeClr val="dk2"/>
               </a:solidFill>
@@ -6596,14 +6596,14 @@
               <a:buNone/>
             </a:pPr>
             <a:r>
-              <a:rPr lang="en" sz="900" b="1">
+              <a:rPr lang="en" sz="900" b="1" dirty="0">
                 <a:solidFill>
                   <a:schemeClr val="dk2"/>
                 </a:solidFill>
               </a:rPr>
-              <a:t>2023</a:t>
+              <a:t>year4</a:t>
             </a:r>
-            <a:endParaRPr sz="1800">
+            <a:endParaRPr sz="1800" dirty="0">
               <a:solidFill>
                 <a:schemeClr val="dk2"/>
               </a:solidFill>
@@ -7733,13 +7733,10 @@
               <a:buNone/>
             </a:pPr>
             <a:r>
-              <a:rPr lang="en-GB" sz="600" dirty="0"/>
-              <a:t>d</a:t>
+              <a:rPr lang="en-GB" sz="600" dirty="0" err="1"/>
+              <a:t>def_description</a:t>
             </a:r>
-            <a:r>
-              <a:rPr lang="en" sz="600" dirty="0"/>
-              <a:t>eforestation_text</a:t>
-            </a:r>
+            <a:endParaRPr lang="en" sz="600" dirty="0"/>
           </a:p>
         </p:txBody>
       </p:sp>

</xml_diff>